<commit_message>
[Informe de avance] android app screenshots
</commit_message>
<xml_diff>
--- a/docs/Reuniones/Sprint 5/Reunion Formal 2014-11-10/Reunion Formal.pptx
+++ b/docs/Reuniones/Sprint 5/Reunion Formal 2014-11-10/Reunion Formal.pptx
@@ -14,8 +14,13 @@
     <p:sldId id="289" r:id="rId8"/>
     <p:sldId id="291" r:id="rId9"/>
     <p:sldId id="288" r:id="rId10"/>
-    <p:sldId id="276" r:id="rId11"/>
-    <p:sldId id="292" r:id="rId12"/>
+    <p:sldId id="293" r:id="rId11"/>
+    <p:sldId id="294" r:id="rId12"/>
+    <p:sldId id="295" r:id="rId13"/>
+    <p:sldId id="296" r:id="rId14"/>
+    <p:sldId id="297" r:id="rId15"/>
+    <p:sldId id="276" r:id="rId16"/>
+    <p:sldId id="292" r:id="rId17"/>
   </p:sldIdLst>
   <p:sldSz cx="12192000" cy="6858000"/>
   <p:notesSz cx="6858000" cy="9144000"/>
@@ -116,7 +121,7 @@
   </p:defaultTextStyle>
   <p:extLst>
     <p:ext uri="{EFAFB233-063F-42B5-8137-9DF3F51BA10A}">
-      <p15:sldGuideLst xmlns="" xmlns:p15="http://schemas.microsoft.com/office/powerpoint/2012/main">
+      <p15:sldGuideLst xmlns:p15="http://schemas.microsoft.com/office/powerpoint/2012/main" xmlns="">
         <p15:guide id="1" orient="horz" pos="2160">
           <p15:clr>
             <a:srgbClr val="A4A3A4"/>
@@ -406,7 +411,7 @@
     </p:spTree>
     <p:extLst>
       <p:ext uri="{BB962C8B-B14F-4D97-AF65-F5344CB8AC3E}">
-        <p14:creationId xmlns="" xmlns:p14="http://schemas.microsoft.com/office/powerpoint/2010/main" val="783670883"/>
+        <p14:creationId xmlns:p14="http://schemas.microsoft.com/office/powerpoint/2010/main" xmlns="" val="783670883"/>
       </p:ext>
     </p:extLst>
   </p:cSld>
@@ -578,7 +583,7 @@
     </p:spTree>
     <p:extLst>
       <p:ext uri="{BB962C8B-B14F-4D97-AF65-F5344CB8AC3E}">
-        <p14:creationId xmlns="" xmlns:p14="http://schemas.microsoft.com/office/powerpoint/2010/main" val="3362801827"/>
+        <p14:creationId xmlns:p14="http://schemas.microsoft.com/office/powerpoint/2010/main" xmlns="" val="3362801827"/>
       </p:ext>
     </p:extLst>
   </p:cSld>
@@ -760,7 +765,7 @@
     </p:spTree>
     <p:extLst>
       <p:ext uri="{BB962C8B-B14F-4D97-AF65-F5344CB8AC3E}">
-        <p14:creationId xmlns="" xmlns:p14="http://schemas.microsoft.com/office/powerpoint/2010/main" val="1559089465"/>
+        <p14:creationId xmlns:p14="http://schemas.microsoft.com/office/powerpoint/2010/main" xmlns="" val="1559089465"/>
       </p:ext>
     </p:extLst>
   </p:cSld>
@@ -932,7 +937,7 @@
     </p:spTree>
     <p:extLst>
       <p:ext uri="{BB962C8B-B14F-4D97-AF65-F5344CB8AC3E}">
-        <p14:creationId xmlns="" xmlns:p14="http://schemas.microsoft.com/office/powerpoint/2010/main" val="4250054912"/>
+        <p14:creationId xmlns:p14="http://schemas.microsoft.com/office/powerpoint/2010/main" xmlns="" val="4250054912"/>
       </p:ext>
     </p:extLst>
   </p:cSld>
@@ -1190,7 +1195,7 @@
     </p:spTree>
     <p:extLst>
       <p:ext uri="{BB962C8B-B14F-4D97-AF65-F5344CB8AC3E}">
-        <p14:creationId xmlns="" xmlns:p14="http://schemas.microsoft.com/office/powerpoint/2010/main" val="2105287886"/>
+        <p14:creationId xmlns:p14="http://schemas.microsoft.com/office/powerpoint/2010/main" xmlns="" val="2105287886"/>
       </p:ext>
     </p:extLst>
   </p:cSld>
@@ -1480,7 +1485,7 @@
     </p:spTree>
     <p:extLst>
       <p:ext uri="{BB962C8B-B14F-4D97-AF65-F5344CB8AC3E}">
-        <p14:creationId xmlns="" xmlns:p14="http://schemas.microsoft.com/office/powerpoint/2010/main" val="2999552341"/>
+        <p14:creationId xmlns:p14="http://schemas.microsoft.com/office/powerpoint/2010/main" xmlns="" val="2999552341"/>
       </p:ext>
     </p:extLst>
   </p:cSld>
@@ -1920,7 +1925,7 @@
     </p:spTree>
     <p:extLst>
       <p:ext uri="{BB962C8B-B14F-4D97-AF65-F5344CB8AC3E}">
-        <p14:creationId xmlns="" xmlns:p14="http://schemas.microsoft.com/office/powerpoint/2010/main" val="375881571"/>
+        <p14:creationId xmlns:p14="http://schemas.microsoft.com/office/powerpoint/2010/main" xmlns="" val="375881571"/>
       </p:ext>
     </p:extLst>
   </p:cSld>
@@ -2040,7 +2045,7 @@
     </p:spTree>
     <p:extLst>
       <p:ext uri="{BB962C8B-B14F-4D97-AF65-F5344CB8AC3E}">
-        <p14:creationId xmlns="" xmlns:p14="http://schemas.microsoft.com/office/powerpoint/2010/main" val="1095840064"/>
+        <p14:creationId xmlns:p14="http://schemas.microsoft.com/office/powerpoint/2010/main" xmlns="" val="1095840064"/>
       </p:ext>
     </p:extLst>
   </p:cSld>
@@ -2137,7 +2142,7 @@
     </p:spTree>
     <p:extLst>
       <p:ext uri="{BB962C8B-B14F-4D97-AF65-F5344CB8AC3E}">
-        <p14:creationId xmlns="" xmlns:p14="http://schemas.microsoft.com/office/powerpoint/2010/main" val="1121564704"/>
+        <p14:creationId xmlns:p14="http://schemas.microsoft.com/office/powerpoint/2010/main" xmlns="" val="1121564704"/>
       </p:ext>
     </p:extLst>
   </p:cSld>
@@ -2505,7 +2510,7 @@
     </p:spTree>
     <p:extLst>
       <p:ext uri="{BB962C8B-B14F-4D97-AF65-F5344CB8AC3E}">
-        <p14:creationId xmlns="" xmlns:p14="http://schemas.microsoft.com/office/powerpoint/2010/main" val="3858346437"/>
+        <p14:creationId xmlns:p14="http://schemas.microsoft.com/office/powerpoint/2010/main" xmlns="" val="3858346437"/>
       </p:ext>
     </p:extLst>
   </p:cSld>
@@ -2833,7 +2838,7 @@
     </p:spTree>
     <p:extLst>
       <p:ext uri="{BB962C8B-B14F-4D97-AF65-F5344CB8AC3E}">
-        <p14:creationId xmlns="" xmlns:p14="http://schemas.microsoft.com/office/powerpoint/2010/main" val="1103777031"/>
+        <p14:creationId xmlns:p14="http://schemas.microsoft.com/office/powerpoint/2010/main" xmlns="" val="1103777031"/>
       </p:ext>
     </p:extLst>
   </p:cSld>
@@ -3088,7 +3093,7 @@
     </p:spTree>
     <p:extLst>
       <p:ext uri="{BB962C8B-B14F-4D97-AF65-F5344CB8AC3E}">
-        <p14:creationId xmlns="" xmlns:p14="http://schemas.microsoft.com/office/powerpoint/2010/main" val="1785626056"/>
+        <p14:creationId xmlns:p14="http://schemas.microsoft.com/office/powerpoint/2010/main" xmlns="" val="1785626056"/>
       </p:ext>
     </p:extLst>
   </p:cSld>
@@ -3603,7 +3608,7 @@
     </p:spTree>
     <p:extLst>
       <p:ext uri="{BB962C8B-B14F-4D97-AF65-F5344CB8AC3E}">
-        <p14:creationId xmlns="" xmlns:p14="http://schemas.microsoft.com/office/powerpoint/2010/main" val="4103899004"/>
+        <p14:creationId xmlns:p14="http://schemas.microsoft.com/office/powerpoint/2010/main" xmlns="" val="4103899004"/>
       </p:ext>
     </p:extLst>
   </p:cSld>
@@ -3649,101 +3654,115 @@
         </p:nvSpPr>
         <p:spPr>
           <a:xfrm>
-            <a:off x="667130" y="259388"/>
+            <a:off x="657223" y="120842"/>
             <a:ext cx="10772775" cy="1658198"/>
           </a:xfrm>
         </p:spPr>
         <p:txBody>
-          <a:bodyPr/>
-          <a:lstStyle/>
-          <a:p>
-            <a:pPr algn="ctr"/>
+          <a:bodyPr>
+            <a:normAutofit/>
+          </a:bodyPr>
+          <a:lstStyle/>
+          <a:p>
+            <a:pPr lvl="0" algn="ctr"/>
             <a:r>
               <a:rPr lang="es-AR" dirty="0" smtClean="0"/>
-              <a:t>Lecciones aprendidas</a:t>
+              <a:t>Estilo en la aplicación </a:t>
+            </a:r>
+            <a:r>
+              <a:rPr lang="es-AR" dirty="0" err="1" smtClean="0"/>
+              <a:t>Android</a:t>
+            </a:r>
+            <a:r>
+              <a:rPr lang="es-AR" dirty="0" smtClean="0"/>
+              <a:t> (2)</a:t>
             </a:r>
             <a:endParaRPr lang="es-AR" dirty="0"/>
           </a:p>
         </p:txBody>
       </p:sp>
-      <p:sp>
-        <p:nvSpPr>
-          <p:cNvPr id="5" name="2 Marcador de contenido"/>
-          <p:cNvSpPr>
-            <a:spLocks noGrp="1"/>
-          </p:cNvSpPr>
-          <p:nvPr>
-            <p:ph idx="1"/>
-          </p:nvPr>
-        </p:nvSpPr>
-        <p:spPr>
-          <a:xfrm>
-            <a:off x="676656" y="1838036"/>
-            <a:ext cx="10753725" cy="4738255"/>
-          </a:xfrm>
-        </p:spPr>
-        <p:txBody>
-          <a:bodyPr>
-            <a:noAutofit/>
-          </a:bodyPr>
-          <a:lstStyle/>
-          <a:p>
-            <a:pPr lvl="0" algn="ctr">
-              <a:buClr>
-                <a:srgbClr val="00B050"/>
-              </a:buClr>
-              <a:buFont typeface="Wingdings" panose="05000000000000000000" pitchFamily="2" charset="2"/>
-              <a:buChar char="ü"/>
-            </a:pPr>
-            <a:endParaRPr lang="es-AR" sz="3200" b="1" dirty="0" smtClean="0"/>
-          </a:p>
-          <a:p>
-            <a:pPr lvl="0" algn="ctr">
-              <a:buClr>
-                <a:srgbClr val="00B050"/>
-              </a:buClr>
-              <a:buFont typeface="Wingdings" panose="05000000000000000000" pitchFamily="2" charset="2"/>
-              <a:buChar char="ü"/>
-            </a:pPr>
-            <a:endParaRPr lang="es-AR" sz="3200" b="1" dirty="0" smtClean="0"/>
-          </a:p>
-          <a:p>
-            <a:pPr lvl="0" algn="ctr">
-              <a:buClr>
-                <a:srgbClr val="00B050"/>
-              </a:buClr>
-              <a:buFont typeface="Wingdings" panose="05000000000000000000" pitchFamily="2" charset="2"/>
-              <a:buChar char="ü"/>
-            </a:pPr>
-            <a:endParaRPr lang="es-AR" sz="3200" b="1" dirty="0" smtClean="0"/>
-          </a:p>
-          <a:p>
-            <a:pPr lvl="0" algn="ctr">
-              <a:buClr>
-                <a:srgbClr val="00B050"/>
-              </a:buClr>
-              <a:buFont typeface="Wingdings" panose="05000000000000000000" pitchFamily="2" charset="2"/>
-              <a:buChar char="ü"/>
-            </a:pPr>
-            <a:r>
-              <a:rPr lang="es-AR" sz="3200" b="1" dirty="0" smtClean="0"/>
-              <a:t>Gestionar los riegos conlleva a buenos resultados</a:t>
-            </a:r>
-          </a:p>
-          <a:p>
-            <a:pPr lvl="3">
-              <a:buClr>
-                <a:srgbClr val="00B050"/>
-              </a:buClr>
-            </a:pPr>
-            <a:endParaRPr lang="es-AR" sz="2600" dirty="0" smtClean="0"/>
-          </a:p>
-        </p:txBody>
-      </p:sp>
+      <p:pic>
+        <p:nvPicPr>
+          <p:cNvPr id="2050" name="Picture 2" descr="C:\Users\MATIAS\Desktop\Nueva carpeta (2)\Screenshot_2013-11-10-18-46-59.png"/>
+          <p:cNvPicPr>
+            <a:picLocks noChangeAspect="1" noChangeArrowheads="1"/>
+          </p:cNvPicPr>
+          <p:nvPr/>
+        </p:nvPicPr>
+        <p:blipFill>
+          <a:blip r:embed="rId2" cstate="print"/>
+          <a:srcRect/>
+          <a:stretch>
+            <a:fillRect/>
+          </a:stretch>
+        </p:blipFill>
+        <p:spPr bwMode="auto">
+          <a:xfrm>
+            <a:off x="8456658" y="1251857"/>
+            <a:ext cx="3048000" cy="5410200"/>
+          </a:xfrm>
+          <a:prstGeom prst="rect">
+            <a:avLst/>
+          </a:prstGeom>
+          <a:noFill/>
+        </p:spPr>
+      </p:pic>
+      <p:pic>
+        <p:nvPicPr>
+          <p:cNvPr id="2051" name="Picture 3" descr="C:\Users\MATIAS\Desktop\Nueva carpeta (2)\Screenshot_2013-11-10-18-45-28.png"/>
+          <p:cNvPicPr>
+            <a:picLocks noChangeAspect="1" noChangeArrowheads="1"/>
+          </p:cNvPicPr>
+          <p:nvPr/>
+        </p:nvPicPr>
+        <p:blipFill>
+          <a:blip r:embed="rId3" cstate="print"/>
+          <a:srcRect/>
+          <a:stretch>
+            <a:fillRect/>
+          </a:stretch>
+        </p:blipFill>
+        <p:spPr bwMode="auto">
+          <a:xfrm>
+            <a:off x="449126" y="1291046"/>
+            <a:ext cx="3048000" cy="5410200"/>
+          </a:xfrm>
+          <a:prstGeom prst="rect">
+            <a:avLst/>
+          </a:prstGeom>
+          <a:noFill/>
+        </p:spPr>
+      </p:pic>
+      <p:pic>
+        <p:nvPicPr>
+          <p:cNvPr id="2052" name="Picture 4" descr="C:\Users\MATIAS\Desktop\Nueva carpeta (2)\Screenshot_2013-11-10-18-45-37.png"/>
+          <p:cNvPicPr>
+            <a:picLocks noChangeAspect="1" noChangeArrowheads="1"/>
+          </p:cNvPicPr>
+          <p:nvPr/>
+        </p:nvPicPr>
+        <p:blipFill>
+          <a:blip r:embed="rId4" cstate="print"/>
+          <a:srcRect/>
+          <a:stretch>
+            <a:fillRect/>
+          </a:stretch>
+        </p:blipFill>
+        <p:spPr bwMode="auto">
+          <a:xfrm>
+            <a:off x="4576989" y="1251857"/>
+            <a:ext cx="3048000" cy="5410200"/>
+          </a:xfrm>
+          <a:prstGeom prst="rect">
+            <a:avLst/>
+          </a:prstGeom>
+          <a:noFill/>
+        </p:spPr>
+      </p:pic>
     </p:spTree>
     <p:extLst>
       <p:ext uri="{BB962C8B-B14F-4D97-AF65-F5344CB8AC3E}">
-        <p14:creationId xmlns="" xmlns:p14="http://schemas.microsoft.com/office/powerpoint/2010/main" val="4094428205"/>
+        <p14:creationId xmlns:p14="http://schemas.microsoft.com/office/powerpoint/2010/main" xmlns="" val="3940033879"/>
       </p:ext>
     </p:extLst>
   </p:cSld>
@@ -3789,6 +3808,742 @@
         </p:nvSpPr>
         <p:spPr>
           <a:xfrm>
+            <a:off x="657223" y="120842"/>
+            <a:ext cx="10772775" cy="1658198"/>
+          </a:xfrm>
+        </p:spPr>
+        <p:txBody>
+          <a:bodyPr>
+            <a:normAutofit/>
+          </a:bodyPr>
+          <a:lstStyle/>
+          <a:p>
+            <a:pPr lvl="0" algn="ctr"/>
+            <a:r>
+              <a:rPr lang="es-AR" dirty="0" smtClean="0"/>
+              <a:t>Estilo en la aplicación </a:t>
+            </a:r>
+            <a:r>
+              <a:rPr lang="es-AR" dirty="0" err="1" smtClean="0"/>
+              <a:t>Android</a:t>
+            </a:r>
+            <a:r>
+              <a:rPr lang="es-AR" dirty="0" smtClean="0"/>
+              <a:t> (3)</a:t>
+            </a:r>
+            <a:endParaRPr lang="es-AR" dirty="0"/>
+          </a:p>
+        </p:txBody>
+      </p:sp>
+      <p:pic>
+        <p:nvPicPr>
+          <p:cNvPr id="3074" name="Picture 2" descr="C:\Users\MATIAS\Desktop\Nueva carpeta (2)\Screenshot_2013-11-06-22-34-49.png"/>
+          <p:cNvPicPr>
+            <a:picLocks noChangeAspect="1" noChangeArrowheads="1"/>
+          </p:cNvPicPr>
+          <p:nvPr/>
+        </p:nvPicPr>
+        <p:blipFill>
+          <a:blip r:embed="rId2" cstate="print"/>
+          <a:srcRect/>
+          <a:stretch>
+            <a:fillRect/>
+          </a:stretch>
+        </p:blipFill>
+        <p:spPr bwMode="auto">
+          <a:xfrm>
+            <a:off x="4314916" y="1251856"/>
+            <a:ext cx="3048000" cy="5410200"/>
+          </a:xfrm>
+          <a:prstGeom prst="rect">
+            <a:avLst/>
+          </a:prstGeom>
+          <a:noFill/>
+        </p:spPr>
+      </p:pic>
+      <p:pic>
+        <p:nvPicPr>
+          <p:cNvPr id="3075" name="Picture 3" descr="C:\Users\MATIAS\Desktop\Nueva carpeta (2)\Screenshot_2013-11-10-18-47-34.png"/>
+          <p:cNvPicPr>
+            <a:picLocks noChangeAspect="1" noChangeArrowheads="1"/>
+          </p:cNvPicPr>
+          <p:nvPr/>
+        </p:nvPicPr>
+        <p:blipFill>
+          <a:blip r:embed="rId3" cstate="print"/>
+          <a:srcRect/>
+          <a:stretch>
+            <a:fillRect/>
+          </a:stretch>
+        </p:blipFill>
+        <p:spPr bwMode="auto">
+          <a:xfrm>
+            <a:off x="535583" y="1226638"/>
+            <a:ext cx="3048000" cy="5410200"/>
+          </a:xfrm>
+          <a:prstGeom prst="rect">
+            <a:avLst/>
+          </a:prstGeom>
+          <a:noFill/>
+        </p:spPr>
+      </p:pic>
+      <p:pic>
+        <p:nvPicPr>
+          <p:cNvPr id="3077" name="Picture 5" descr="C:\Users\MATIAS\Desktop\Nueva carpeta (2)\Screenshot_2013-11-10-18-49-12.png"/>
+          <p:cNvPicPr>
+            <a:picLocks noChangeAspect="1" noChangeArrowheads="1"/>
+          </p:cNvPicPr>
+          <p:nvPr/>
+        </p:nvPicPr>
+        <p:blipFill>
+          <a:blip r:embed="rId4" cstate="print"/>
+          <a:srcRect/>
+          <a:stretch>
+            <a:fillRect/>
+          </a:stretch>
+        </p:blipFill>
+        <p:spPr bwMode="auto">
+          <a:xfrm>
+            <a:off x="8076655" y="1252855"/>
+            <a:ext cx="3048000" cy="5410200"/>
+          </a:xfrm>
+          <a:prstGeom prst="rect">
+            <a:avLst/>
+          </a:prstGeom>
+          <a:noFill/>
+        </p:spPr>
+      </p:pic>
+    </p:spTree>
+    <p:extLst>
+      <p:ext uri="{BB962C8B-B14F-4D97-AF65-F5344CB8AC3E}">
+        <p14:creationId xmlns:p14="http://schemas.microsoft.com/office/powerpoint/2010/main" xmlns="" val="3940033879"/>
+      </p:ext>
+    </p:extLst>
+  </p:cSld>
+  <p:clrMapOvr>
+    <a:masterClrMapping/>
+  </p:clrMapOvr>
+  <p:timing>
+    <p:tnLst>
+      <p:par>
+        <p:cTn id="1" dur="indefinite" restart="never" nodeType="tmRoot"/>
+      </p:par>
+    </p:tnLst>
+  </p:timing>
+</p:sld>
+</file>
+
+<file path=ppt/slides/slide12.xml><?xml version="1.0" encoding="utf-8"?>
+<p:sld xmlns:a="http://schemas.openxmlformats.org/drawingml/2006/main" xmlns:r="http://schemas.openxmlformats.org/officeDocument/2006/relationships" xmlns:p="http://schemas.openxmlformats.org/presentationml/2006/main">
+  <p:cSld>
+    <p:spTree>
+      <p:nvGrpSpPr>
+        <p:cNvPr id="1" name=""/>
+        <p:cNvGrpSpPr/>
+        <p:nvPr/>
+      </p:nvGrpSpPr>
+      <p:grpSpPr>
+        <a:xfrm>
+          <a:off x="0" y="0"/>
+          <a:ext cx="0" cy="0"/>
+          <a:chOff x="0" y="0"/>
+          <a:chExt cx="0" cy="0"/>
+        </a:xfrm>
+      </p:grpSpPr>
+      <p:sp>
+        <p:nvSpPr>
+          <p:cNvPr id="2" name="Title 1"/>
+          <p:cNvSpPr>
+            <a:spLocks noGrp="1"/>
+          </p:cNvSpPr>
+          <p:nvPr>
+            <p:ph type="title"/>
+          </p:nvPr>
+        </p:nvSpPr>
+        <p:spPr>
+          <a:xfrm>
+            <a:off x="657223" y="120842"/>
+            <a:ext cx="10772775" cy="1658198"/>
+          </a:xfrm>
+        </p:spPr>
+        <p:txBody>
+          <a:bodyPr>
+            <a:normAutofit/>
+          </a:bodyPr>
+          <a:lstStyle/>
+          <a:p>
+            <a:pPr lvl="0" algn="ctr"/>
+            <a:r>
+              <a:rPr lang="es-AR" dirty="0" smtClean="0"/>
+              <a:t>Estilo en la aplicación </a:t>
+            </a:r>
+            <a:r>
+              <a:rPr lang="es-AR" dirty="0" err="1" smtClean="0"/>
+              <a:t>Android</a:t>
+            </a:r>
+            <a:r>
+              <a:rPr lang="es-AR" dirty="0" smtClean="0"/>
+              <a:t> (4)</a:t>
+            </a:r>
+            <a:endParaRPr lang="es-AR" dirty="0"/>
+          </a:p>
+        </p:txBody>
+      </p:sp>
+      <p:pic>
+        <p:nvPicPr>
+          <p:cNvPr id="4098" name="Picture 2" descr="C:\Users\MATIAS\Desktop\Nueva carpeta (2)\Screenshot_2013-11-10-18-48-48.png"/>
+          <p:cNvPicPr>
+            <a:picLocks noChangeAspect="1" noChangeArrowheads="1"/>
+          </p:cNvPicPr>
+          <p:nvPr/>
+        </p:nvPicPr>
+        <p:blipFill>
+          <a:blip r:embed="rId2" cstate="print"/>
+          <a:srcRect/>
+          <a:stretch>
+            <a:fillRect/>
+          </a:stretch>
+        </p:blipFill>
+        <p:spPr bwMode="auto">
+          <a:xfrm>
+            <a:off x="539882" y="1266508"/>
+            <a:ext cx="3048000" cy="5410200"/>
+          </a:xfrm>
+          <a:prstGeom prst="rect">
+            <a:avLst/>
+          </a:prstGeom>
+          <a:noFill/>
+        </p:spPr>
+      </p:pic>
+      <p:pic>
+        <p:nvPicPr>
+          <p:cNvPr id="4099" name="Picture 3" descr="C:\Users\MATIAS\Desktop\Nueva carpeta (2)\Screenshot_2013-11-10-18-48-53.png"/>
+          <p:cNvPicPr>
+            <a:picLocks noChangeAspect="1" noChangeArrowheads="1"/>
+          </p:cNvPicPr>
+          <p:nvPr/>
+        </p:nvPicPr>
+        <p:blipFill>
+          <a:blip r:embed="rId3" cstate="print"/>
+          <a:srcRect/>
+          <a:stretch>
+            <a:fillRect/>
+          </a:stretch>
+        </p:blipFill>
+        <p:spPr bwMode="auto">
+          <a:xfrm>
+            <a:off x="4289512" y="1266417"/>
+            <a:ext cx="3048000" cy="5410200"/>
+          </a:xfrm>
+          <a:prstGeom prst="rect">
+            <a:avLst/>
+          </a:prstGeom>
+          <a:noFill/>
+        </p:spPr>
+      </p:pic>
+      <p:pic>
+        <p:nvPicPr>
+          <p:cNvPr id="4100" name="Picture 4" descr="C:\Users\MATIAS\Desktop\Nueva carpeta (2)\Screenshot_2013-11-10-18-49-05.png"/>
+          <p:cNvPicPr>
+            <a:picLocks noChangeAspect="1" noChangeArrowheads="1"/>
+          </p:cNvPicPr>
+          <p:nvPr/>
+        </p:nvPicPr>
+        <p:blipFill>
+          <a:blip r:embed="rId4" cstate="print"/>
+          <a:srcRect/>
+          <a:stretch>
+            <a:fillRect/>
+          </a:stretch>
+        </p:blipFill>
+        <p:spPr bwMode="auto">
+          <a:xfrm>
+            <a:off x="8103687" y="1279571"/>
+            <a:ext cx="3048000" cy="5410200"/>
+          </a:xfrm>
+          <a:prstGeom prst="rect">
+            <a:avLst/>
+          </a:prstGeom>
+          <a:noFill/>
+        </p:spPr>
+      </p:pic>
+    </p:spTree>
+    <p:extLst>
+      <p:ext uri="{BB962C8B-B14F-4D97-AF65-F5344CB8AC3E}">
+        <p14:creationId xmlns:p14="http://schemas.microsoft.com/office/powerpoint/2010/main" xmlns="" val="3940033879"/>
+      </p:ext>
+    </p:extLst>
+  </p:cSld>
+  <p:clrMapOvr>
+    <a:masterClrMapping/>
+  </p:clrMapOvr>
+  <p:timing>
+    <p:tnLst>
+      <p:par>
+        <p:cTn id="1" dur="indefinite" restart="never" nodeType="tmRoot"/>
+      </p:par>
+    </p:tnLst>
+  </p:timing>
+</p:sld>
+</file>
+
+<file path=ppt/slides/slide13.xml><?xml version="1.0" encoding="utf-8"?>
+<p:sld xmlns:a="http://schemas.openxmlformats.org/drawingml/2006/main" xmlns:r="http://schemas.openxmlformats.org/officeDocument/2006/relationships" xmlns:p="http://schemas.openxmlformats.org/presentationml/2006/main">
+  <p:cSld>
+    <p:spTree>
+      <p:nvGrpSpPr>
+        <p:cNvPr id="1" name=""/>
+        <p:cNvGrpSpPr/>
+        <p:nvPr/>
+      </p:nvGrpSpPr>
+      <p:grpSpPr>
+        <a:xfrm>
+          <a:off x="0" y="0"/>
+          <a:ext cx="0" cy="0"/>
+          <a:chOff x="0" y="0"/>
+          <a:chExt cx="0" cy="0"/>
+        </a:xfrm>
+      </p:grpSpPr>
+      <p:sp>
+        <p:nvSpPr>
+          <p:cNvPr id="2" name="Title 1"/>
+          <p:cNvSpPr>
+            <a:spLocks noGrp="1"/>
+          </p:cNvSpPr>
+          <p:nvPr>
+            <p:ph type="title"/>
+          </p:nvPr>
+        </p:nvSpPr>
+        <p:spPr>
+          <a:xfrm>
+            <a:off x="657223" y="120842"/>
+            <a:ext cx="10772775" cy="1658198"/>
+          </a:xfrm>
+        </p:spPr>
+        <p:txBody>
+          <a:bodyPr>
+            <a:normAutofit/>
+          </a:bodyPr>
+          <a:lstStyle/>
+          <a:p>
+            <a:pPr lvl="0" algn="ctr"/>
+            <a:r>
+              <a:rPr lang="es-AR" dirty="0" smtClean="0"/>
+              <a:t>Estilo en la aplicación </a:t>
+            </a:r>
+            <a:r>
+              <a:rPr lang="es-AR" dirty="0" err="1" smtClean="0"/>
+              <a:t>Android</a:t>
+            </a:r>
+            <a:r>
+              <a:rPr lang="es-AR" dirty="0" smtClean="0"/>
+              <a:t> (5)</a:t>
+            </a:r>
+            <a:endParaRPr lang="es-AR" dirty="0"/>
+          </a:p>
+        </p:txBody>
+      </p:sp>
+      <p:pic>
+        <p:nvPicPr>
+          <p:cNvPr id="5123" name="Picture 3" descr="C:\Users\MATIAS\Desktop\Nueva carpeta (2)\Screenshot_2013-11-10-18-47-50.png"/>
+          <p:cNvPicPr>
+            <a:picLocks noChangeAspect="1" noChangeArrowheads="1"/>
+          </p:cNvPicPr>
+          <p:nvPr/>
+        </p:nvPicPr>
+        <p:blipFill>
+          <a:blip r:embed="rId2" cstate="print"/>
+          <a:srcRect/>
+          <a:stretch>
+            <a:fillRect/>
+          </a:stretch>
+        </p:blipFill>
+        <p:spPr bwMode="auto">
+          <a:xfrm>
+            <a:off x="6483622" y="1317170"/>
+            <a:ext cx="3048000" cy="5410200"/>
+          </a:xfrm>
+          <a:prstGeom prst="rect">
+            <a:avLst/>
+          </a:prstGeom>
+          <a:noFill/>
+        </p:spPr>
+      </p:pic>
+      <p:pic>
+        <p:nvPicPr>
+          <p:cNvPr id="5124" name="Picture 4" descr="C:\Users\MATIAS\Desktop\Nueva carpeta (2)\Screenshot_2013-11-10-18-48-05.png"/>
+          <p:cNvPicPr>
+            <a:picLocks noChangeAspect="1" noChangeArrowheads="1"/>
+          </p:cNvPicPr>
+          <p:nvPr/>
+        </p:nvPicPr>
+        <p:blipFill>
+          <a:blip r:embed="rId3" cstate="print"/>
+          <a:srcRect/>
+          <a:stretch>
+            <a:fillRect/>
+          </a:stretch>
+        </p:blipFill>
+        <p:spPr bwMode="auto">
+          <a:xfrm>
+            <a:off x="1754642" y="1292770"/>
+            <a:ext cx="3048000" cy="5410200"/>
+          </a:xfrm>
+          <a:prstGeom prst="rect">
+            <a:avLst/>
+          </a:prstGeom>
+          <a:noFill/>
+        </p:spPr>
+      </p:pic>
+    </p:spTree>
+    <p:extLst>
+      <p:ext uri="{BB962C8B-B14F-4D97-AF65-F5344CB8AC3E}">
+        <p14:creationId xmlns:p14="http://schemas.microsoft.com/office/powerpoint/2010/main" xmlns="" val="3940033879"/>
+      </p:ext>
+    </p:extLst>
+  </p:cSld>
+  <p:clrMapOvr>
+    <a:masterClrMapping/>
+  </p:clrMapOvr>
+  <p:timing>
+    <p:tnLst>
+      <p:par>
+        <p:cTn id="1" dur="indefinite" restart="never" nodeType="tmRoot"/>
+      </p:par>
+    </p:tnLst>
+  </p:timing>
+</p:sld>
+</file>
+
+<file path=ppt/slides/slide14.xml><?xml version="1.0" encoding="utf-8"?>
+<p:sld xmlns:a="http://schemas.openxmlformats.org/drawingml/2006/main" xmlns:r="http://schemas.openxmlformats.org/officeDocument/2006/relationships" xmlns:p="http://schemas.openxmlformats.org/presentationml/2006/main">
+  <p:cSld>
+    <p:spTree>
+      <p:nvGrpSpPr>
+        <p:cNvPr id="1" name=""/>
+        <p:cNvGrpSpPr/>
+        <p:nvPr/>
+      </p:nvGrpSpPr>
+      <p:grpSpPr>
+        <a:xfrm>
+          <a:off x="0" y="0"/>
+          <a:ext cx="0" cy="0"/>
+          <a:chOff x="0" y="0"/>
+          <a:chExt cx="0" cy="0"/>
+        </a:xfrm>
+      </p:grpSpPr>
+      <p:sp>
+        <p:nvSpPr>
+          <p:cNvPr id="2" name="Title 1"/>
+          <p:cNvSpPr>
+            <a:spLocks noGrp="1"/>
+          </p:cNvSpPr>
+          <p:nvPr>
+            <p:ph type="title"/>
+          </p:nvPr>
+        </p:nvSpPr>
+        <p:spPr>
+          <a:xfrm>
+            <a:off x="657223" y="120842"/>
+            <a:ext cx="10772775" cy="1658198"/>
+          </a:xfrm>
+        </p:spPr>
+        <p:txBody>
+          <a:bodyPr>
+            <a:normAutofit/>
+          </a:bodyPr>
+          <a:lstStyle/>
+          <a:p>
+            <a:pPr lvl="0" algn="ctr"/>
+            <a:r>
+              <a:rPr lang="es-AR" dirty="0" smtClean="0"/>
+              <a:t>Estilo en la aplicación </a:t>
+            </a:r>
+            <a:r>
+              <a:rPr lang="es-AR" dirty="0" err="1" smtClean="0"/>
+              <a:t>Android</a:t>
+            </a:r>
+            <a:r>
+              <a:rPr lang="es-AR" dirty="0" smtClean="0"/>
+              <a:t> (6)</a:t>
+            </a:r>
+            <a:endParaRPr lang="es-AR" dirty="0"/>
+          </a:p>
+        </p:txBody>
+      </p:sp>
+      <p:pic>
+        <p:nvPicPr>
+          <p:cNvPr id="6146" name="Picture 2" descr="C:\Users\MATIAS\Desktop\Nueva carpeta (2)\Screenshot_2013-11-10-18-47-15.png"/>
+          <p:cNvPicPr>
+            <a:picLocks noChangeAspect="1" noChangeArrowheads="1"/>
+          </p:cNvPicPr>
+          <p:nvPr/>
+        </p:nvPicPr>
+        <p:blipFill>
+          <a:blip r:embed="rId2" cstate="print"/>
+          <a:srcRect/>
+          <a:stretch>
+            <a:fillRect/>
+          </a:stretch>
+        </p:blipFill>
+        <p:spPr bwMode="auto">
+          <a:xfrm>
+            <a:off x="4432908" y="1318126"/>
+            <a:ext cx="3048000" cy="5410200"/>
+          </a:xfrm>
+          <a:prstGeom prst="rect">
+            <a:avLst/>
+          </a:prstGeom>
+          <a:noFill/>
+        </p:spPr>
+      </p:pic>
+      <p:pic>
+        <p:nvPicPr>
+          <p:cNvPr id="6147" name="Picture 3" descr="C:\Users\MATIAS\Desktop\Nueva carpeta (2)\Screenshot_2013-11-10-18-48-56.png"/>
+          <p:cNvPicPr>
+            <a:picLocks noChangeAspect="1" noChangeArrowheads="1"/>
+          </p:cNvPicPr>
+          <p:nvPr/>
+        </p:nvPicPr>
+        <p:blipFill>
+          <a:blip r:embed="rId3" cstate="print"/>
+          <a:srcRect/>
+          <a:stretch>
+            <a:fillRect/>
+          </a:stretch>
+        </p:blipFill>
+        <p:spPr bwMode="auto">
+          <a:xfrm>
+            <a:off x="8273344" y="1318125"/>
+            <a:ext cx="3048000" cy="5410200"/>
+          </a:xfrm>
+          <a:prstGeom prst="rect">
+            <a:avLst/>
+          </a:prstGeom>
+          <a:noFill/>
+        </p:spPr>
+      </p:pic>
+      <p:pic>
+        <p:nvPicPr>
+          <p:cNvPr id="6148" name="Picture 4"/>
+          <p:cNvPicPr>
+            <a:picLocks noChangeAspect="1" noChangeArrowheads="1"/>
+          </p:cNvPicPr>
+          <p:nvPr/>
+        </p:nvPicPr>
+        <p:blipFill>
+          <a:blip r:embed="rId4" cstate="print"/>
+          <a:srcRect/>
+          <a:stretch>
+            <a:fillRect/>
+          </a:stretch>
+        </p:blipFill>
+        <p:spPr bwMode="auto">
+          <a:xfrm>
+            <a:off x="496390" y="1259477"/>
+            <a:ext cx="3048000" cy="5410200"/>
+          </a:xfrm>
+          <a:prstGeom prst="rect">
+            <a:avLst/>
+          </a:prstGeom>
+          <a:noFill/>
+          <a:ln w="9525">
+            <a:noFill/>
+            <a:miter lim="800000"/>
+            <a:headEnd/>
+            <a:tailEnd/>
+          </a:ln>
+        </p:spPr>
+      </p:pic>
+    </p:spTree>
+    <p:extLst>
+      <p:ext uri="{BB962C8B-B14F-4D97-AF65-F5344CB8AC3E}">
+        <p14:creationId xmlns:p14="http://schemas.microsoft.com/office/powerpoint/2010/main" xmlns="" val="3940033879"/>
+      </p:ext>
+    </p:extLst>
+  </p:cSld>
+  <p:clrMapOvr>
+    <a:masterClrMapping/>
+  </p:clrMapOvr>
+  <p:timing>
+    <p:tnLst>
+      <p:par>
+        <p:cTn id="1" dur="indefinite" restart="never" nodeType="tmRoot"/>
+      </p:par>
+    </p:tnLst>
+  </p:timing>
+</p:sld>
+</file>
+
+<file path=ppt/slides/slide15.xml><?xml version="1.0" encoding="utf-8"?>
+<p:sld xmlns:a="http://schemas.openxmlformats.org/drawingml/2006/main" xmlns:r="http://schemas.openxmlformats.org/officeDocument/2006/relationships" xmlns:p="http://schemas.openxmlformats.org/presentationml/2006/main">
+  <p:cSld>
+    <p:spTree>
+      <p:nvGrpSpPr>
+        <p:cNvPr id="1" name=""/>
+        <p:cNvGrpSpPr/>
+        <p:nvPr/>
+      </p:nvGrpSpPr>
+      <p:grpSpPr>
+        <a:xfrm>
+          <a:off x="0" y="0"/>
+          <a:ext cx="0" cy="0"/>
+          <a:chOff x="0" y="0"/>
+          <a:chExt cx="0" cy="0"/>
+        </a:xfrm>
+      </p:grpSpPr>
+      <p:sp>
+        <p:nvSpPr>
+          <p:cNvPr id="2" name="Title 1"/>
+          <p:cNvSpPr>
+            <a:spLocks noGrp="1"/>
+          </p:cNvSpPr>
+          <p:nvPr>
+            <p:ph type="title"/>
+          </p:nvPr>
+        </p:nvSpPr>
+        <p:spPr>
+          <a:xfrm>
+            <a:off x="667130" y="259388"/>
+            <a:ext cx="10772775" cy="1658198"/>
+          </a:xfrm>
+        </p:spPr>
+        <p:txBody>
+          <a:bodyPr/>
+          <a:lstStyle/>
+          <a:p>
+            <a:pPr algn="ctr"/>
+            <a:r>
+              <a:rPr lang="es-AR" dirty="0" smtClean="0"/>
+              <a:t>Lecciones aprendidas</a:t>
+            </a:r>
+            <a:endParaRPr lang="es-AR" dirty="0"/>
+          </a:p>
+        </p:txBody>
+      </p:sp>
+      <p:sp>
+        <p:nvSpPr>
+          <p:cNvPr id="5" name="2 Marcador de contenido"/>
+          <p:cNvSpPr>
+            <a:spLocks noGrp="1"/>
+          </p:cNvSpPr>
+          <p:nvPr>
+            <p:ph idx="1"/>
+          </p:nvPr>
+        </p:nvSpPr>
+        <p:spPr>
+          <a:xfrm>
+            <a:off x="676656" y="1838036"/>
+            <a:ext cx="10753725" cy="4738255"/>
+          </a:xfrm>
+        </p:spPr>
+        <p:txBody>
+          <a:bodyPr>
+            <a:noAutofit/>
+          </a:bodyPr>
+          <a:lstStyle/>
+          <a:p>
+            <a:pPr lvl="0" algn="ctr">
+              <a:buClr>
+                <a:srgbClr val="00B050"/>
+              </a:buClr>
+              <a:buFont typeface="Wingdings" panose="05000000000000000000" pitchFamily="2" charset="2"/>
+              <a:buChar char="ü"/>
+            </a:pPr>
+            <a:endParaRPr lang="es-AR" sz="3200" b="1" dirty="0" smtClean="0"/>
+          </a:p>
+          <a:p>
+            <a:pPr lvl="0" algn="ctr">
+              <a:buClr>
+                <a:srgbClr val="00B050"/>
+              </a:buClr>
+              <a:buFont typeface="Wingdings" panose="05000000000000000000" pitchFamily="2" charset="2"/>
+              <a:buChar char="ü"/>
+            </a:pPr>
+            <a:endParaRPr lang="es-AR" sz="3200" b="1" dirty="0" smtClean="0"/>
+          </a:p>
+          <a:p>
+            <a:pPr lvl="0" algn="ctr">
+              <a:buClr>
+                <a:srgbClr val="00B050"/>
+              </a:buClr>
+              <a:buFont typeface="Wingdings" panose="05000000000000000000" pitchFamily="2" charset="2"/>
+              <a:buChar char="ü"/>
+            </a:pPr>
+            <a:endParaRPr lang="es-AR" sz="3200" b="1" dirty="0" smtClean="0"/>
+          </a:p>
+          <a:p>
+            <a:pPr lvl="0" algn="ctr">
+              <a:buClr>
+                <a:srgbClr val="00B050"/>
+              </a:buClr>
+              <a:buFont typeface="Wingdings" panose="05000000000000000000" pitchFamily="2" charset="2"/>
+              <a:buChar char="ü"/>
+            </a:pPr>
+            <a:r>
+              <a:rPr lang="es-AR" sz="3200" b="1" dirty="0" smtClean="0"/>
+              <a:t>Gestionar los riegos conlleva a buenos resultados</a:t>
+            </a:r>
+          </a:p>
+          <a:p>
+            <a:pPr lvl="3">
+              <a:buClr>
+                <a:srgbClr val="00B050"/>
+              </a:buClr>
+            </a:pPr>
+            <a:endParaRPr lang="es-AR" sz="2600" dirty="0" smtClean="0"/>
+          </a:p>
+        </p:txBody>
+      </p:sp>
+    </p:spTree>
+    <p:extLst>
+      <p:ext uri="{BB962C8B-B14F-4D97-AF65-F5344CB8AC3E}">
+        <p14:creationId xmlns:p14="http://schemas.microsoft.com/office/powerpoint/2010/main" xmlns="" val="4094428205"/>
+      </p:ext>
+    </p:extLst>
+  </p:cSld>
+  <p:clrMapOvr>
+    <a:masterClrMapping/>
+  </p:clrMapOvr>
+  <p:timing>
+    <p:tnLst>
+      <p:par>
+        <p:cTn id="1" dur="indefinite" restart="never" nodeType="tmRoot"/>
+      </p:par>
+    </p:tnLst>
+  </p:timing>
+</p:sld>
+</file>
+
+<file path=ppt/slides/slide16.xml><?xml version="1.0" encoding="utf-8"?>
+<p:sld xmlns:a="http://schemas.openxmlformats.org/drawingml/2006/main" xmlns:r="http://schemas.openxmlformats.org/officeDocument/2006/relationships" xmlns:p="http://schemas.openxmlformats.org/presentationml/2006/main">
+  <p:cSld>
+    <p:spTree>
+      <p:nvGrpSpPr>
+        <p:cNvPr id="1" name=""/>
+        <p:cNvGrpSpPr/>
+        <p:nvPr/>
+      </p:nvGrpSpPr>
+      <p:grpSpPr>
+        <a:xfrm>
+          <a:off x="0" y="0"/>
+          <a:ext cx="0" cy="0"/>
+          <a:chOff x="0" y="0"/>
+          <a:chExt cx="0" cy="0"/>
+        </a:xfrm>
+      </p:grpSpPr>
+      <p:sp>
+        <p:nvSpPr>
+          <p:cNvPr id="2" name="Title 1"/>
+          <p:cNvSpPr>
+            <a:spLocks noGrp="1"/>
+          </p:cNvSpPr>
+          <p:nvPr>
+            <p:ph type="title"/>
+          </p:nvPr>
+        </p:nvSpPr>
+        <p:spPr>
+          <a:xfrm>
             <a:off x="667130" y="259388"/>
             <a:ext cx="10772775" cy="1658198"/>
           </a:xfrm>
@@ -3817,7 +4572,7 @@
           </p:nvPr>
         </p:nvPicPr>
         <p:blipFill>
-          <a:blip r:embed="rId2"/>
+          <a:blip r:embed="rId2" cstate="print"/>
           <a:stretch>
             <a:fillRect/>
           </a:stretch>
@@ -3832,7 +4587,7 @@
     </p:spTree>
     <p:extLst>
       <p:ext uri="{BB962C8B-B14F-4D97-AF65-F5344CB8AC3E}">
-        <p14:creationId xmlns="" xmlns:p14="http://schemas.microsoft.com/office/powerpoint/2010/main" val="4094428205"/>
+        <p14:creationId xmlns:p14="http://schemas.microsoft.com/office/powerpoint/2010/main" xmlns="" val="4094428205"/>
       </p:ext>
     </p:extLst>
   </p:cSld>
@@ -3972,7 +4727,7 @@
     </p:spTree>
     <p:extLst>
       <p:ext uri="{BB962C8B-B14F-4D97-AF65-F5344CB8AC3E}">
-        <p14:creationId xmlns="" xmlns:p14="http://schemas.microsoft.com/office/powerpoint/2010/main" val="3019863904"/>
+        <p14:creationId xmlns:p14="http://schemas.microsoft.com/office/powerpoint/2010/main" xmlns="" val="3019863904"/>
       </p:ext>
     </p:extLst>
   </p:cSld>
@@ -4154,7 +4909,7 @@
     </p:spTree>
     <p:extLst>
       <p:ext uri="{BB962C8B-B14F-4D97-AF65-F5344CB8AC3E}">
-        <p14:creationId xmlns="" xmlns:p14="http://schemas.microsoft.com/office/powerpoint/2010/main" val="4068815418"/>
+        <p14:creationId xmlns:p14="http://schemas.microsoft.com/office/powerpoint/2010/main" xmlns="" val="4068815418"/>
       </p:ext>
     </p:extLst>
   </p:cSld>
@@ -4260,7 +5015,7 @@
           <p:nvPr/>
         </p:nvPicPr>
         <p:blipFill>
-          <a:blip r:embed="rId2"/>
+          <a:blip r:embed="rId2" cstate="print"/>
           <a:srcRect/>
           <a:stretch>
             <a:fillRect/>
@@ -4287,7 +5042,7 @@
     </p:spTree>
     <p:extLst>
       <p:ext uri="{BB962C8B-B14F-4D97-AF65-F5344CB8AC3E}">
-        <p14:creationId xmlns="" xmlns:p14="http://schemas.microsoft.com/office/powerpoint/2010/main" val="3167588023"/>
+        <p14:creationId xmlns:p14="http://schemas.microsoft.com/office/powerpoint/2010/main" xmlns="" val="3167588023"/>
       </p:ext>
     </p:extLst>
   </p:cSld>
@@ -4355,7 +5110,7 @@
     </p:spTree>
     <p:extLst>
       <p:ext uri="{BB962C8B-B14F-4D97-AF65-F5344CB8AC3E}">
-        <p14:creationId xmlns="" xmlns:p14="http://schemas.microsoft.com/office/powerpoint/2010/main" val="1441697277"/>
+        <p14:creationId xmlns:p14="http://schemas.microsoft.com/office/powerpoint/2010/main" xmlns="" val="1441697277"/>
       </p:ext>
     </p:extLst>
   </p:cSld>
@@ -4431,7 +5186,7 @@
           </p:nvPr>
         </p:nvPicPr>
         <p:blipFill>
-          <a:blip r:embed="rId2"/>
+          <a:blip r:embed="rId2" cstate="print"/>
           <a:srcRect/>
           <a:stretch>
             <a:fillRect/>
@@ -4458,7 +5213,7 @@
     </p:spTree>
     <p:extLst>
       <p:ext uri="{BB962C8B-B14F-4D97-AF65-F5344CB8AC3E}">
-        <p14:creationId xmlns="" xmlns:p14="http://schemas.microsoft.com/office/powerpoint/2010/main" val="2970320782"/>
+        <p14:creationId xmlns:p14="http://schemas.microsoft.com/office/powerpoint/2010/main" xmlns="" val="2970320782"/>
       </p:ext>
     </p:extLst>
   </p:cSld>
@@ -4547,7 +5302,7 @@
     </p:spTree>
     <p:extLst>
       <p:ext uri="{BB962C8B-B14F-4D97-AF65-F5344CB8AC3E}">
-        <p14:creationId xmlns="" xmlns:p14="http://schemas.microsoft.com/office/powerpoint/2010/main" val="2970320782"/>
+        <p14:creationId xmlns:p14="http://schemas.microsoft.com/office/powerpoint/2010/main" xmlns="" val="2970320782"/>
       </p:ext>
     </p:extLst>
   </p:cSld>
@@ -4634,7 +5389,7 @@
     </p:spTree>
     <p:extLst>
       <p:ext uri="{BB962C8B-B14F-4D97-AF65-F5344CB8AC3E}">
-        <p14:creationId xmlns="" xmlns:p14="http://schemas.microsoft.com/office/powerpoint/2010/main" val="2970320782"/>
+        <p14:creationId xmlns:p14="http://schemas.microsoft.com/office/powerpoint/2010/main" xmlns="" val="2970320782"/>
       </p:ext>
     </p:extLst>
   </p:cSld>
@@ -4703,10 +5458,88 @@
           </a:p>
         </p:txBody>
       </p:sp>
+      <p:pic>
+        <p:nvPicPr>
+          <p:cNvPr id="1026" name="Picture 2" descr="C:\Users\MATIAS\Desktop\Nueva carpeta (2)\Screenshot_2013-11-10-18-44-56.png"/>
+          <p:cNvPicPr>
+            <a:picLocks noChangeAspect="1" noChangeArrowheads="1"/>
+          </p:cNvPicPr>
+          <p:nvPr/>
+        </p:nvPicPr>
+        <p:blipFill>
+          <a:blip r:embed="rId2" cstate="print"/>
+          <a:srcRect/>
+          <a:stretch>
+            <a:fillRect/>
+          </a:stretch>
+        </p:blipFill>
+        <p:spPr bwMode="auto">
+          <a:xfrm>
+            <a:off x="461644" y="1252221"/>
+            <a:ext cx="3048000" cy="5410200"/>
+          </a:xfrm>
+          <a:prstGeom prst="rect">
+            <a:avLst/>
+          </a:prstGeom>
+          <a:noFill/>
+        </p:spPr>
+      </p:pic>
+      <p:pic>
+        <p:nvPicPr>
+          <p:cNvPr id="1027" name="Picture 3" descr="C:\Users\MATIAS\Desktop\Nueva carpeta (2)\Screenshot_2013-11-10-18-45-05.png"/>
+          <p:cNvPicPr>
+            <a:picLocks noChangeAspect="1" noChangeArrowheads="1"/>
+          </p:cNvPicPr>
+          <p:nvPr/>
+        </p:nvPicPr>
+        <p:blipFill>
+          <a:blip r:embed="rId3" cstate="print"/>
+          <a:srcRect/>
+          <a:stretch>
+            <a:fillRect/>
+          </a:stretch>
+        </p:blipFill>
+        <p:spPr bwMode="auto">
+          <a:xfrm>
+            <a:off x="4185103" y="1226185"/>
+            <a:ext cx="3048000" cy="5410200"/>
+          </a:xfrm>
+          <a:prstGeom prst="rect">
+            <a:avLst/>
+          </a:prstGeom>
+          <a:noFill/>
+        </p:spPr>
+      </p:pic>
+      <p:pic>
+        <p:nvPicPr>
+          <p:cNvPr id="1028" name="Picture 4" descr="C:\Users\MATIAS\Desktop\Nueva carpeta (2)\Screenshot_2013-11-10-18-45-12.png"/>
+          <p:cNvPicPr>
+            <a:picLocks noChangeAspect="1" noChangeArrowheads="1"/>
+          </p:cNvPicPr>
+          <p:nvPr/>
+        </p:nvPicPr>
+        <p:blipFill>
+          <a:blip r:embed="rId4" cstate="print"/>
+          <a:srcRect/>
+          <a:stretch>
+            <a:fillRect/>
+          </a:stretch>
+        </p:blipFill>
+        <p:spPr bwMode="auto">
+          <a:xfrm>
+            <a:off x="8130087" y="1240111"/>
+            <a:ext cx="3048000" cy="5410200"/>
+          </a:xfrm>
+          <a:prstGeom prst="rect">
+            <a:avLst/>
+          </a:prstGeom>
+          <a:noFill/>
+        </p:spPr>
+      </p:pic>
     </p:spTree>
     <p:extLst>
       <p:ext uri="{BB962C8B-B14F-4D97-AF65-F5344CB8AC3E}">
-        <p14:creationId xmlns="" xmlns:p14="http://schemas.microsoft.com/office/powerpoint/2010/main" val="3940033879"/>
+        <p14:creationId xmlns:p14="http://schemas.microsoft.com/office/powerpoint/2010/main" xmlns="" val="3940033879"/>
       </p:ext>
     </p:extLst>
   </p:cSld>
@@ -4954,7 +5787,7 @@
   <a:extraClrSchemeLst/>
   <a:extLst>
     <a:ext uri="{05A4C25C-085E-4340-85A3-A5531E510DB2}">
-      <thm15:themeFamily xmlns="" xmlns:thm15="http://schemas.microsoft.com/office/thememl/2012/main" name="Metropolitan" id="{4C5440D6-04D2-4954-96CF-F251137069B2}" vid="{79CFCA13-9412-4290-BB4B-85112F88857B}"/>
+      <thm15:themeFamily xmlns:thm15="http://schemas.microsoft.com/office/thememl/2012/main" xmlns="" name="Metropolitan" id="{4C5440D6-04D2-4954-96CF-F251137069B2}" vid="{79CFCA13-9412-4290-BB4B-85112F88857B}"/>
     </a:ext>
   </a:extLst>
 </a:theme>

</xml_diff>

<commit_message>
Updated Reunion Formal.pptx and 20131111MetricAnalysis.xlsx. Item #367
</commit_message>
<xml_diff>
--- a/docs/Reuniones/Sprint 5/Reunion Formal 2014-11-10/Reunion Formal.pptx
+++ b/docs/Reuniones/Sprint 5/Reunion Formal 2014-11-10/Reunion Formal.pptx
@@ -121,7 +121,7 @@
   </p:defaultTextStyle>
   <p:extLst>
     <p:ext uri="{EFAFB233-063F-42B5-8137-9DF3F51BA10A}">
-      <p15:sldGuideLst xmlns:p15="http://schemas.microsoft.com/office/powerpoint/2012/main" xmlns="">
+      <p15:sldGuideLst xmlns:p15="http://schemas.microsoft.com/office/powerpoint/2012/main">
         <p15:guide id="1" orient="horz" pos="2160">
           <p15:clr>
             <a:srgbClr val="A4A3A4"/>
@@ -402,7 +402,7 @@
             <a:fld id="{146C01B7-3F94-48E0-9801-4B4D2FF8F9CB}" type="slidenum">
               <a:rPr lang="es-AR" smtClean="0"/>
               <a:pPr/>
-              <a:t>‹Nº›</a:t>
+              <a:t>‹#›</a:t>
             </a:fld>
             <a:endParaRPr lang="es-AR"/>
           </a:p>
@@ -411,7 +411,7 @@
     </p:spTree>
     <p:extLst>
       <p:ext uri="{BB962C8B-B14F-4D97-AF65-F5344CB8AC3E}">
-        <p14:creationId xmlns:p14="http://schemas.microsoft.com/office/powerpoint/2010/main" xmlns="" val="783670883"/>
+        <p14:creationId xmlns:p14="http://schemas.microsoft.com/office/powerpoint/2010/main" val="783670883"/>
       </p:ext>
     </p:extLst>
   </p:cSld>
@@ -574,7 +574,7 @@
             <a:fld id="{146C01B7-3F94-48E0-9801-4B4D2FF8F9CB}" type="slidenum">
               <a:rPr lang="es-AR" smtClean="0"/>
               <a:pPr/>
-              <a:t>‹Nº›</a:t>
+              <a:t>‹#›</a:t>
             </a:fld>
             <a:endParaRPr lang="es-AR"/>
           </a:p>
@@ -583,7 +583,7 @@
     </p:spTree>
     <p:extLst>
       <p:ext uri="{BB962C8B-B14F-4D97-AF65-F5344CB8AC3E}">
-        <p14:creationId xmlns:p14="http://schemas.microsoft.com/office/powerpoint/2010/main" xmlns="" val="3362801827"/>
+        <p14:creationId xmlns:p14="http://schemas.microsoft.com/office/powerpoint/2010/main" val="3362801827"/>
       </p:ext>
     </p:extLst>
   </p:cSld>
@@ -756,7 +756,7 @@
             <a:fld id="{146C01B7-3F94-48E0-9801-4B4D2FF8F9CB}" type="slidenum">
               <a:rPr lang="es-AR" smtClean="0"/>
               <a:pPr/>
-              <a:t>‹Nº›</a:t>
+              <a:t>‹#›</a:t>
             </a:fld>
             <a:endParaRPr lang="es-AR"/>
           </a:p>
@@ -765,7 +765,7 @@
     </p:spTree>
     <p:extLst>
       <p:ext uri="{BB962C8B-B14F-4D97-AF65-F5344CB8AC3E}">
-        <p14:creationId xmlns:p14="http://schemas.microsoft.com/office/powerpoint/2010/main" xmlns="" val="1559089465"/>
+        <p14:creationId xmlns:p14="http://schemas.microsoft.com/office/powerpoint/2010/main" val="1559089465"/>
       </p:ext>
     </p:extLst>
   </p:cSld>
@@ -928,7 +928,7 @@
             <a:fld id="{146C01B7-3F94-48E0-9801-4B4D2FF8F9CB}" type="slidenum">
               <a:rPr lang="es-AR" smtClean="0"/>
               <a:pPr/>
-              <a:t>‹Nº›</a:t>
+              <a:t>‹#›</a:t>
             </a:fld>
             <a:endParaRPr lang="es-AR"/>
           </a:p>
@@ -937,7 +937,7 @@
     </p:spTree>
     <p:extLst>
       <p:ext uri="{BB962C8B-B14F-4D97-AF65-F5344CB8AC3E}">
-        <p14:creationId xmlns:p14="http://schemas.microsoft.com/office/powerpoint/2010/main" xmlns="" val="4250054912"/>
+        <p14:creationId xmlns:p14="http://schemas.microsoft.com/office/powerpoint/2010/main" val="4250054912"/>
       </p:ext>
     </p:extLst>
   </p:cSld>
@@ -1186,7 +1186,7 @@
             <a:fld id="{146C01B7-3F94-48E0-9801-4B4D2FF8F9CB}" type="slidenum">
               <a:rPr lang="es-AR" smtClean="0"/>
               <a:pPr/>
-              <a:t>‹Nº›</a:t>
+              <a:t>‹#›</a:t>
             </a:fld>
             <a:endParaRPr lang="es-AR"/>
           </a:p>
@@ -1195,7 +1195,7 @@
     </p:spTree>
     <p:extLst>
       <p:ext uri="{BB962C8B-B14F-4D97-AF65-F5344CB8AC3E}">
-        <p14:creationId xmlns:p14="http://schemas.microsoft.com/office/powerpoint/2010/main" xmlns="" val="2105287886"/>
+        <p14:creationId xmlns:p14="http://schemas.microsoft.com/office/powerpoint/2010/main" val="2105287886"/>
       </p:ext>
     </p:extLst>
   </p:cSld>
@@ -1476,7 +1476,7 @@
             <a:fld id="{146C01B7-3F94-48E0-9801-4B4D2FF8F9CB}" type="slidenum">
               <a:rPr lang="es-AR" smtClean="0"/>
               <a:pPr/>
-              <a:t>‹Nº›</a:t>
+              <a:t>‹#›</a:t>
             </a:fld>
             <a:endParaRPr lang="es-AR"/>
           </a:p>
@@ -1485,7 +1485,7 @@
     </p:spTree>
     <p:extLst>
       <p:ext uri="{BB962C8B-B14F-4D97-AF65-F5344CB8AC3E}">
-        <p14:creationId xmlns:p14="http://schemas.microsoft.com/office/powerpoint/2010/main" xmlns="" val="2999552341"/>
+        <p14:creationId xmlns:p14="http://schemas.microsoft.com/office/powerpoint/2010/main" val="2999552341"/>
       </p:ext>
     </p:extLst>
   </p:cSld>
@@ -1916,7 +1916,7 @@
             <a:fld id="{146C01B7-3F94-48E0-9801-4B4D2FF8F9CB}" type="slidenum">
               <a:rPr lang="es-AR" smtClean="0"/>
               <a:pPr/>
-              <a:t>‹Nº›</a:t>
+              <a:t>‹#›</a:t>
             </a:fld>
             <a:endParaRPr lang="es-AR"/>
           </a:p>
@@ -1925,7 +1925,7 @@
     </p:spTree>
     <p:extLst>
       <p:ext uri="{BB962C8B-B14F-4D97-AF65-F5344CB8AC3E}">
-        <p14:creationId xmlns:p14="http://schemas.microsoft.com/office/powerpoint/2010/main" xmlns="" val="375881571"/>
+        <p14:creationId xmlns:p14="http://schemas.microsoft.com/office/powerpoint/2010/main" val="375881571"/>
       </p:ext>
     </p:extLst>
   </p:cSld>
@@ -2036,7 +2036,7 @@
             <a:fld id="{146C01B7-3F94-48E0-9801-4B4D2FF8F9CB}" type="slidenum">
               <a:rPr lang="es-AR" smtClean="0"/>
               <a:pPr/>
-              <a:t>‹Nº›</a:t>
+              <a:t>‹#›</a:t>
             </a:fld>
             <a:endParaRPr lang="es-AR"/>
           </a:p>
@@ -2045,7 +2045,7 @@
     </p:spTree>
     <p:extLst>
       <p:ext uri="{BB962C8B-B14F-4D97-AF65-F5344CB8AC3E}">
-        <p14:creationId xmlns:p14="http://schemas.microsoft.com/office/powerpoint/2010/main" xmlns="" val="1095840064"/>
+        <p14:creationId xmlns:p14="http://schemas.microsoft.com/office/powerpoint/2010/main" val="1095840064"/>
       </p:ext>
     </p:extLst>
   </p:cSld>
@@ -2133,7 +2133,7 @@
             <a:fld id="{146C01B7-3F94-48E0-9801-4B4D2FF8F9CB}" type="slidenum">
               <a:rPr lang="es-AR" smtClean="0"/>
               <a:pPr/>
-              <a:t>‹Nº›</a:t>
+              <a:t>‹#›</a:t>
             </a:fld>
             <a:endParaRPr lang="es-AR"/>
           </a:p>
@@ -2142,7 +2142,7 @@
     </p:spTree>
     <p:extLst>
       <p:ext uri="{BB962C8B-B14F-4D97-AF65-F5344CB8AC3E}">
-        <p14:creationId xmlns:p14="http://schemas.microsoft.com/office/powerpoint/2010/main" xmlns="" val="1121564704"/>
+        <p14:creationId xmlns:p14="http://schemas.microsoft.com/office/powerpoint/2010/main" val="1121564704"/>
       </p:ext>
     </p:extLst>
   </p:cSld>
@@ -2501,7 +2501,7 @@
             <a:fld id="{146C01B7-3F94-48E0-9801-4B4D2FF8F9CB}" type="slidenum">
               <a:rPr lang="es-AR" smtClean="0"/>
               <a:pPr/>
-              <a:t>‹Nº›</a:t>
+              <a:t>‹#›</a:t>
             </a:fld>
             <a:endParaRPr lang="es-AR"/>
           </a:p>
@@ -2510,7 +2510,7 @@
     </p:spTree>
     <p:extLst>
       <p:ext uri="{BB962C8B-B14F-4D97-AF65-F5344CB8AC3E}">
-        <p14:creationId xmlns:p14="http://schemas.microsoft.com/office/powerpoint/2010/main" xmlns="" val="3858346437"/>
+        <p14:creationId xmlns:p14="http://schemas.microsoft.com/office/powerpoint/2010/main" val="3858346437"/>
       </p:ext>
     </p:extLst>
   </p:cSld>
@@ -2829,7 +2829,7 @@
             <a:fld id="{146C01B7-3F94-48E0-9801-4B4D2FF8F9CB}" type="slidenum">
               <a:rPr lang="es-AR" smtClean="0"/>
               <a:pPr/>
-              <a:t>‹Nº›</a:t>
+              <a:t>‹#›</a:t>
             </a:fld>
             <a:endParaRPr lang="es-AR"/>
           </a:p>
@@ -2838,7 +2838,7 @@
     </p:spTree>
     <p:extLst>
       <p:ext uri="{BB962C8B-B14F-4D97-AF65-F5344CB8AC3E}">
-        <p14:creationId xmlns:p14="http://schemas.microsoft.com/office/powerpoint/2010/main" xmlns="" val="1103777031"/>
+        <p14:creationId xmlns:p14="http://schemas.microsoft.com/office/powerpoint/2010/main" val="1103777031"/>
       </p:ext>
     </p:extLst>
   </p:cSld>
@@ -3084,7 +3084,7 @@
             <a:fld id="{146C01B7-3F94-48E0-9801-4B4D2FF8F9CB}" type="slidenum">
               <a:rPr lang="es-AR" smtClean="0"/>
               <a:pPr/>
-              <a:t>‹Nº›</a:t>
+              <a:t>‹#›</a:t>
             </a:fld>
             <a:endParaRPr lang="es-AR"/>
           </a:p>
@@ -3093,7 +3093,7 @@
     </p:spTree>
     <p:extLst>
       <p:ext uri="{BB962C8B-B14F-4D97-AF65-F5344CB8AC3E}">
-        <p14:creationId xmlns:p14="http://schemas.microsoft.com/office/powerpoint/2010/main" xmlns="" val="1785626056"/>
+        <p14:creationId xmlns:p14="http://schemas.microsoft.com/office/powerpoint/2010/main" val="1785626056"/>
       </p:ext>
     </p:extLst>
   </p:cSld>
@@ -3608,7 +3608,7 @@
     </p:spTree>
     <p:extLst>
       <p:ext uri="{BB962C8B-B14F-4D97-AF65-F5344CB8AC3E}">
-        <p14:creationId xmlns:p14="http://schemas.microsoft.com/office/powerpoint/2010/main" xmlns="" val="4103899004"/>
+        <p14:creationId xmlns:p14="http://schemas.microsoft.com/office/powerpoint/2010/main" val="4103899004"/>
       </p:ext>
     </p:extLst>
   </p:cSld>
@@ -3762,7 +3762,7 @@
     </p:spTree>
     <p:extLst>
       <p:ext uri="{BB962C8B-B14F-4D97-AF65-F5344CB8AC3E}">
-        <p14:creationId xmlns:p14="http://schemas.microsoft.com/office/powerpoint/2010/main" xmlns="" val="3940033879"/>
+        <p14:creationId xmlns:p14="http://schemas.microsoft.com/office/powerpoint/2010/main" val="3940033879"/>
       </p:ext>
     </p:extLst>
   </p:cSld>
@@ -3916,7 +3916,7 @@
     </p:spTree>
     <p:extLst>
       <p:ext uri="{BB962C8B-B14F-4D97-AF65-F5344CB8AC3E}">
-        <p14:creationId xmlns:p14="http://schemas.microsoft.com/office/powerpoint/2010/main" xmlns="" val="3940033879"/>
+        <p14:creationId xmlns:p14="http://schemas.microsoft.com/office/powerpoint/2010/main" val="3940033879"/>
       </p:ext>
     </p:extLst>
   </p:cSld>
@@ -4070,7 +4070,7 @@
     </p:spTree>
     <p:extLst>
       <p:ext uri="{BB962C8B-B14F-4D97-AF65-F5344CB8AC3E}">
-        <p14:creationId xmlns:p14="http://schemas.microsoft.com/office/powerpoint/2010/main" xmlns="" val="3940033879"/>
+        <p14:creationId xmlns:p14="http://schemas.microsoft.com/office/powerpoint/2010/main" val="3940033879"/>
       </p:ext>
     </p:extLst>
   </p:cSld>
@@ -4198,7 +4198,7 @@
     </p:spTree>
     <p:extLst>
       <p:ext uri="{BB962C8B-B14F-4D97-AF65-F5344CB8AC3E}">
-        <p14:creationId xmlns:p14="http://schemas.microsoft.com/office/powerpoint/2010/main" xmlns="" val="3940033879"/>
+        <p14:creationId xmlns:p14="http://schemas.microsoft.com/office/powerpoint/2010/main" val="3940033879"/>
       </p:ext>
     </p:extLst>
   </p:cSld>
@@ -4358,7 +4358,7 @@
     </p:spTree>
     <p:extLst>
       <p:ext uri="{BB962C8B-B14F-4D97-AF65-F5344CB8AC3E}">
-        <p14:creationId xmlns:p14="http://schemas.microsoft.com/office/powerpoint/2010/main" xmlns="" val="3940033879"/>
+        <p14:creationId xmlns:p14="http://schemas.microsoft.com/office/powerpoint/2010/main" val="3940033879"/>
       </p:ext>
     </p:extLst>
   </p:cSld>
@@ -4443,7 +4443,7 @@
           </a:bodyPr>
           <a:lstStyle/>
           <a:p>
-            <a:pPr lvl="0" algn="ctr">
+            <a:pPr lvl="0">
               <a:buClr>
                 <a:srgbClr val="00B050"/>
               </a:buClr>
@@ -4453,52 +4453,75 @@
             <a:endParaRPr lang="es-AR" sz="3200" b="1" dirty="0" smtClean="0"/>
           </a:p>
           <a:p>
-            <a:pPr lvl="0" algn="ctr">
+            <a:pPr lvl="0">
               <a:buClr>
                 <a:srgbClr val="00B050"/>
               </a:buClr>
               <a:buFont typeface="Wingdings" panose="05000000000000000000" pitchFamily="2" charset="2"/>
               <a:buChar char="ü"/>
             </a:pPr>
-            <a:endParaRPr lang="es-AR" sz="3200" b="1" dirty="0" smtClean="0"/>
-          </a:p>
-          <a:p>
-            <a:pPr lvl="0" algn="ctr">
+            <a:r>
+              <a:rPr lang="es-AR" sz="3200" dirty="0" smtClean="0"/>
+              <a:t>Fue fundamental la gestión de los riesgos (</a:t>
+            </a:r>
+            <a:r>
+              <a:rPr lang="es-AR" sz="3200" dirty="0" err="1" smtClean="0"/>
+              <a:t>exámen</a:t>
+            </a:r>
+            <a:r>
+              <a:rPr lang="es-AR" sz="3200" dirty="0" smtClean="0"/>
+              <a:t>) para poder terminar el proyecto cumpliendo con el cliente</a:t>
+            </a:r>
+            <a:endParaRPr lang="es-AR" sz="2600" dirty="0"/>
+          </a:p>
+          <a:p>
+            <a:pPr lvl="0">
               <a:buClr>
                 <a:srgbClr val="00B050"/>
               </a:buClr>
               <a:buFont typeface="Wingdings" panose="05000000000000000000" pitchFamily="2" charset="2"/>
               <a:buChar char="ü"/>
             </a:pPr>
-            <a:endParaRPr lang="es-AR" sz="3200" b="1" dirty="0" smtClean="0"/>
-          </a:p>
-          <a:p>
-            <a:pPr lvl="0" algn="ctr">
-              <a:buClr>
-                <a:srgbClr val="00B050"/>
-              </a:buClr>
-              <a:buFont typeface="Wingdings" panose="05000000000000000000" pitchFamily="2" charset="2"/>
-              <a:buChar char="ü"/>
-            </a:pPr>
-            <a:r>
-              <a:rPr lang="es-AR" sz="3200" b="1" dirty="0" smtClean="0"/>
-              <a:t>Gestionar los riegos conlleva a buenos resultados</a:t>
-            </a:r>
-          </a:p>
-          <a:p>
-            <a:pPr lvl="3">
-              <a:buClr>
-                <a:srgbClr val="00B050"/>
-              </a:buClr>
-            </a:pPr>
-            <a:endParaRPr lang="es-AR" sz="2600" dirty="0" smtClean="0"/>
+            <a:r>
+              <a:rPr lang="en-US" sz="3200" dirty="0" err="1" smtClean="0"/>
+              <a:t>Faltó</a:t>
+            </a:r>
+            <a:r>
+              <a:rPr lang="en-US" sz="3200" dirty="0" smtClean="0"/>
+              <a:t> </a:t>
+            </a:r>
+            <a:r>
+              <a:rPr lang="en-US" sz="3200" dirty="0" err="1" smtClean="0"/>
+              <a:t>agregar</a:t>
+            </a:r>
+            <a:r>
+              <a:rPr lang="en-US" sz="3200" dirty="0" smtClean="0"/>
+              <a:t> spike para </a:t>
+            </a:r>
+            <a:r>
+              <a:rPr lang="en-US" sz="3200" dirty="0" err="1" smtClean="0"/>
+              <a:t>creación</a:t>
+            </a:r>
+            <a:r>
+              <a:rPr lang="en-US" sz="3200" dirty="0" smtClean="0"/>
+              <a:t> de reports en </a:t>
+            </a:r>
+            <a:r>
+              <a:rPr lang="en-US" sz="3200" dirty="0" err="1" smtClean="0"/>
+              <a:t>formato</a:t>
+            </a:r>
+            <a:r>
+              <a:rPr lang="en-US" sz="3200" dirty="0" smtClean="0"/>
+              <a:t> PDF</a:t>
+            </a:r>
+            <a:endParaRPr lang="es-AR" sz="4000" dirty="0" smtClean="0"/>
           </a:p>
         </p:txBody>
       </p:sp>
     </p:spTree>
     <p:extLst>
       <p:ext uri="{BB962C8B-B14F-4D97-AF65-F5344CB8AC3E}">
-        <p14:creationId xmlns:p14="http://schemas.microsoft.com/office/powerpoint/2010/main" xmlns="" val="4094428205"/>
+        <p14:creationId xmlns:p14="http://schemas.microsoft.com/office/powerpoint/2010/main" val="4094428205"/>
       </p:ext>
     </p:extLst>
   </p:cSld>
@@ -4544,7 +4567,7 @@
         </p:nvSpPr>
         <p:spPr>
           <a:xfrm>
-            <a:off x="667130" y="259388"/>
+            <a:off x="709613" y="2599901"/>
             <a:ext cx="10772775" cy="1658198"/>
           </a:xfrm>
         </p:spPr>
@@ -4555,39 +4578,16 @@
             <a:pPr algn="ctr"/>
             <a:r>
               <a:rPr lang="es-AR" dirty="0" smtClean="0"/>
-              <a:t>Preguntas</a:t>
+              <a:t>Preguntas?</a:t>
             </a:r>
             <a:endParaRPr lang="es-AR" dirty="0"/>
           </a:p>
         </p:txBody>
       </p:sp>
-      <p:pic>
-        <p:nvPicPr>
-          <p:cNvPr id="6" name="5 Marcador de contenido" descr="descarga.jpg"/>
-          <p:cNvPicPr>
-            <a:picLocks noGrp="1" noChangeAspect="1"/>
-          </p:cNvPicPr>
-          <p:nvPr>
-            <p:ph idx="1"/>
-          </p:nvPr>
-        </p:nvPicPr>
-        <p:blipFill>
-          <a:blip r:embed="rId2" cstate="print"/>
-          <a:stretch>
-            <a:fillRect/>
-          </a:stretch>
-        </p:blipFill>
-        <p:spPr>
-          <a:xfrm>
-            <a:off x="4206243" y="1635400"/>
-            <a:ext cx="3666309" cy="4578326"/>
-          </a:xfrm>
-        </p:spPr>
-      </p:pic>
     </p:spTree>
     <p:extLst>
       <p:ext uri="{BB962C8B-B14F-4D97-AF65-F5344CB8AC3E}">
-        <p14:creationId xmlns:p14="http://schemas.microsoft.com/office/powerpoint/2010/main" xmlns="" val="4094428205"/>
+        <p14:creationId xmlns:p14="http://schemas.microsoft.com/office/powerpoint/2010/main" val="4094428205"/>
       </p:ext>
     </p:extLst>
   </p:cSld>
@@ -4727,7 +4727,7 @@
     </p:spTree>
     <p:extLst>
       <p:ext uri="{BB962C8B-B14F-4D97-AF65-F5344CB8AC3E}">
-        <p14:creationId xmlns:p14="http://schemas.microsoft.com/office/powerpoint/2010/main" xmlns="" val="3019863904"/>
+        <p14:creationId xmlns:p14="http://schemas.microsoft.com/office/powerpoint/2010/main" val="3019863904"/>
       </p:ext>
     </p:extLst>
   </p:cSld>
@@ -4909,7 +4909,7 @@
     </p:spTree>
     <p:extLst>
       <p:ext uri="{BB962C8B-B14F-4D97-AF65-F5344CB8AC3E}">
-        <p14:creationId xmlns:p14="http://schemas.microsoft.com/office/powerpoint/2010/main" xmlns="" val="4068815418"/>
+        <p14:creationId xmlns:p14="http://schemas.microsoft.com/office/powerpoint/2010/main" val="4068815418"/>
       </p:ext>
     </p:extLst>
   </p:cSld>
@@ -5008,41 +5008,31 @@
       </p:sp>
       <p:pic>
         <p:nvPicPr>
-          <p:cNvPr id="4" name="Picture 2"/>
+          <p:cNvPr id="6" name="Picture 5"/>
           <p:cNvPicPr>
-            <a:picLocks noChangeAspect="1" noChangeArrowheads="1"/>
+            <a:picLocks noChangeAspect="1"/>
           </p:cNvPicPr>
           <p:nvPr/>
         </p:nvPicPr>
-        <p:blipFill>
-          <a:blip r:embed="rId2" cstate="print"/>
-          <a:srcRect/>
-          <a:stretch>
-            <a:fillRect/>
-          </a:stretch>
+        <p:blipFill rotWithShape="1">
+          <a:blip r:embed="rId2"/>
+          <a:srcRect l="1804" t="13236" r="1769" b="12133"/>
+          <a:stretch/>
         </p:blipFill>
-        <p:spPr bwMode="auto">
-          <a:xfrm>
-            <a:off x="0" y="1213083"/>
-            <a:ext cx="12201525" cy="5476875"/>
+        <p:spPr>
+          <a:xfrm>
+            <a:off x="927846" y="1554118"/>
+            <a:ext cx="10722903" cy="4666129"/>
           </a:xfrm>
           <a:prstGeom prst="rect">
             <a:avLst/>
           </a:prstGeom>
-          <a:noFill/>
-          <a:ln w="9525">
-            <a:noFill/>
-            <a:miter lim="800000"/>
-            <a:headEnd/>
-            <a:tailEnd/>
-          </a:ln>
-          <a:effectLst/>
         </p:spPr>
       </p:pic>
     </p:spTree>
     <p:extLst>
       <p:ext uri="{BB962C8B-B14F-4D97-AF65-F5344CB8AC3E}">
-        <p14:creationId xmlns:p14="http://schemas.microsoft.com/office/powerpoint/2010/main" xmlns="" val="3167588023"/>
+        <p14:creationId xmlns:p14="http://schemas.microsoft.com/office/powerpoint/2010/main" val="3167588023"/>
       </p:ext>
     </p:extLst>
   </p:cSld>
@@ -5107,10 +5097,34 @@
           </a:p>
         </p:txBody>
       </p:sp>
+      <p:pic>
+        <p:nvPicPr>
+          <p:cNvPr id="3" name="Picture 2"/>
+          <p:cNvPicPr>
+            <a:picLocks noChangeAspect="1"/>
+          </p:cNvPicPr>
+          <p:nvPr/>
+        </p:nvPicPr>
+        <p:blipFill>
+          <a:blip r:embed="rId2"/>
+          <a:stretch>
+            <a:fillRect/>
+          </a:stretch>
+        </p:blipFill>
+        <p:spPr>
+          <a:xfrm>
+            <a:off x="2310262" y="1819533"/>
+            <a:ext cx="7657143" cy="4133333"/>
+          </a:xfrm>
+          <a:prstGeom prst="rect">
+            <a:avLst/>
+          </a:prstGeom>
+        </p:spPr>
+      </p:pic>
     </p:spTree>
     <p:extLst>
       <p:ext uri="{BB962C8B-B14F-4D97-AF65-F5344CB8AC3E}">
-        <p14:creationId xmlns:p14="http://schemas.microsoft.com/office/powerpoint/2010/main" xmlns="" val="1441697277"/>
+        <p14:creationId xmlns:p14="http://schemas.microsoft.com/office/powerpoint/2010/main" val="1441697277"/>
       </p:ext>
     </p:extLst>
   </p:cSld>
@@ -5177,6 +5191,30 @@
       </p:sp>
       <p:pic>
         <p:nvPicPr>
+          <p:cNvPr id="3" name="Picture 2"/>
+          <p:cNvPicPr>
+            <a:picLocks noChangeAspect="1"/>
+          </p:cNvPicPr>
+          <p:nvPr/>
+        </p:nvPicPr>
+        <p:blipFill>
+          <a:blip r:embed="rId2"/>
+          <a:stretch>
+            <a:fillRect/>
+          </a:stretch>
+        </p:blipFill>
+        <p:spPr>
+          <a:xfrm>
+            <a:off x="282387" y="1492361"/>
+            <a:ext cx="8010995" cy="4730441"/>
+          </a:xfrm>
+          <a:prstGeom prst="rect">
+            <a:avLst/>
+          </a:prstGeom>
+        </p:spPr>
+      </p:pic>
+      <p:pic>
+        <p:nvPicPr>
           <p:cNvPr id="1026" name="Picture 2"/>
           <p:cNvPicPr>
             <a:picLocks noGrp="1" noChangeAspect="1" noChangeArrowheads="1"/>
@@ -5186,7 +5224,7 @@
           </p:nvPr>
         </p:nvPicPr>
         <p:blipFill>
-          <a:blip r:embed="rId2" cstate="print"/>
+          <a:blip r:embed="rId3" cstate="print"/>
           <a:srcRect/>
           <a:stretch>
             <a:fillRect/>
@@ -5194,7 +5232,7 @@
         </p:blipFill>
         <p:spPr bwMode="auto">
           <a:xfrm>
-            <a:off x="3423680" y="2011363"/>
+            <a:off x="5827655" y="1892980"/>
             <a:ext cx="5681127" cy="4594573"/>
           </a:xfrm>
           <a:prstGeom prst="rect">
@@ -5213,7 +5251,7 @@
     </p:spTree>
     <p:extLst>
       <p:ext uri="{BB962C8B-B14F-4D97-AF65-F5344CB8AC3E}">
-        <p14:creationId xmlns:p14="http://schemas.microsoft.com/office/powerpoint/2010/main" xmlns="" val="2970320782"/>
+        <p14:creationId xmlns:p14="http://schemas.microsoft.com/office/powerpoint/2010/main" val="2970320782"/>
       </p:ext>
     </p:extLst>
   </p:cSld>
@@ -5247,6 +5285,30 @@
           <a:chExt cx="0" cy="0"/>
         </a:xfrm>
       </p:grpSpPr>
+      <p:pic>
+        <p:nvPicPr>
+          <p:cNvPr id="6" name="Picture 5"/>
+          <p:cNvPicPr>
+            <a:picLocks noChangeAspect="1"/>
+          </p:cNvPicPr>
+          <p:nvPr/>
+        </p:nvPicPr>
+        <p:blipFill>
+          <a:blip r:embed="rId2"/>
+          <a:stretch>
+            <a:fillRect/>
+          </a:stretch>
+        </p:blipFill>
+        <p:spPr>
+          <a:xfrm>
+            <a:off x="349623" y="1938631"/>
+            <a:ext cx="6199708" cy="4678887"/>
+          </a:xfrm>
+          <a:prstGeom prst="rect">
+            <a:avLst/>
+          </a:prstGeom>
+        </p:spPr>
+      </p:pic>
       <p:sp>
         <p:nvSpPr>
           <p:cNvPr id="2" name="Title 1"/>
@@ -5280,29 +5342,34 @@
           </a:p>
         </p:txBody>
       </p:sp>
-      <p:sp>
-        <p:nvSpPr>
-          <p:cNvPr id="5" name="4 Marcador de contenido"/>
-          <p:cNvSpPr>
-            <a:spLocks noGrp="1"/>
-          </p:cNvSpPr>
-          <p:nvPr>
-            <p:ph idx="1"/>
-          </p:nvPr>
-        </p:nvSpPr>
-        <p:spPr/>
-        <p:txBody>
-          <a:bodyPr/>
-          <a:lstStyle/>
-          <a:p>
-            <a:endParaRPr lang="es-AR" dirty="0"/>
-          </a:p>
-        </p:txBody>
-      </p:sp>
+      <p:pic>
+        <p:nvPicPr>
+          <p:cNvPr id="4" name="Picture 3"/>
+          <p:cNvPicPr>
+            <a:picLocks noChangeAspect="1"/>
+          </p:cNvPicPr>
+          <p:nvPr/>
+        </p:nvPicPr>
+        <p:blipFill>
+          <a:blip r:embed="rId3"/>
+          <a:stretch>
+            <a:fillRect/>
+          </a:stretch>
+        </p:blipFill>
+        <p:spPr>
+          <a:xfrm>
+            <a:off x="5272199" y="2393576"/>
+            <a:ext cx="6157800" cy="3768998"/>
+          </a:xfrm>
+          <a:prstGeom prst="rect">
+            <a:avLst/>
+          </a:prstGeom>
+        </p:spPr>
+      </p:pic>
     </p:spTree>
     <p:extLst>
       <p:ext uri="{BB962C8B-B14F-4D97-AF65-F5344CB8AC3E}">
-        <p14:creationId xmlns:p14="http://schemas.microsoft.com/office/powerpoint/2010/main" xmlns="" val="2970320782"/>
+        <p14:creationId xmlns:p14="http://schemas.microsoft.com/office/powerpoint/2010/main" val="2970320782"/>
       </p:ext>
     </p:extLst>
   </p:cSld>
@@ -5367,29 +5434,58 @@
           </a:p>
         </p:txBody>
       </p:sp>
-      <p:sp>
-        <p:nvSpPr>
-          <p:cNvPr id="5" name="4 Marcador de contenido"/>
-          <p:cNvSpPr>
-            <a:spLocks noGrp="1"/>
-          </p:cNvSpPr>
-          <p:nvPr>
-            <p:ph idx="1"/>
-          </p:nvPr>
-        </p:nvSpPr>
-        <p:spPr/>
-        <p:txBody>
-          <a:bodyPr/>
-          <a:lstStyle/>
-          <a:p>
-            <a:endParaRPr lang="es-AR" dirty="0"/>
-          </a:p>
-        </p:txBody>
-      </p:sp>
+      <p:pic>
+        <p:nvPicPr>
+          <p:cNvPr id="4" name="Picture 3"/>
+          <p:cNvPicPr>
+            <a:picLocks noChangeAspect="1"/>
+          </p:cNvPicPr>
+          <p:nvPr/>
+        </p:nvPicPr>
+        <p:blipFill>
+          <a:blip r:embed="rId2"/>
+          <a:stretch>
+            <a:fillRect/>
+          </a:stretch>
+        </p:blipFill>
+        <p:spPr>
+          <a:xfrm>
+            <a:off x="416858" y="1913800"/>
+            <a:ext cx="5325165" cy="4742494"/>
+          </a:xfrm>
+          <a:prstGeom prst="rect">
+            <a:avLst/>
+          </a:prstGeom>
+        </p:spPr>
+      </p:pic>
+      <p:pic>
+        <p:nvPicPr>
+          <p:cNvPr id="7" name="Picture 6"/>
+          <p:cNvPicPr>
+            <a:picLocks noChangeAspect="1"/>
+          </p:cNvPicPr>
+          <p:nvPr/>
+        </p:nvPicPr>
+        <p:blipFill>
+          <a:blip r:embed="rId3"/>
+          <a:stretch>
+            <a:fillRect/>
+          </a:stretch>
+        </p:blipFill>
+        <p:spPr>
+          <a:xfrm>
+            <a:off x="5982389" y="1913800"/>
+            <a:ext cx="5483978" cy="4890704"/>
+          </a:xfrm>
+          <a:prstGeom prst="rect">
+            <a:avLst/>
+          </a:prstGeom>
+        </p:spPr>
+      </p:pic>
     </p:spTree>
     <p:extLst>
       <p:ext uri="{BB962C8B-B14F-4D97-AF65-F5344CB8AC3E}">
-        <p14:creationId xmlns:p14="http://schemas.microsoft.com/office/powerpoint/2010/main" xmlns="" val="2970320782"/>
+        <p14:creationId xmlns:p14="http://schemas.microsoft.com/office/powerpoint/2010/main" val="2970320782"/>
       </p:ext>
     </p:extLst>
   </p:cSld>
@@ -5539,7 +5635,7 @@
     </p:spTree>
     <p:extLst>
       <p:ext uri="{BB962C8B-B14F-4D97-AF65-F5344CB8AC3E}">
-        <p14:creationId xmlns:p14="http://schemas.microsoft.com/office/powerpoint/2010/main" xmlns="" val="3940033879"/>
+        <p14:creationId xmlns:p14="http://schemas.microsoft.com/office/powerpoint/2010/main" val="3940033879"/>
       </p:ext>
     </p:extLst>
   </p:cSld>
@@ -5787,7 +5883,7 @@
   <a:extraClrSchemeLst/>
   <a:extLst>
     <a:ext uri="{05A4C25C-085E-4340-85A3-A5531E510DB2}">
-      <thm15:themeFamily xmlns:thm15="http://schemas.microsoft.com/office/thememl/2012/main" xmlns="" name="Metropolitan" id="{4C5440D6-04D2-4954-96CF-F251137069B2}" vid="{79CFCA13-9412-4290-BB4B-85112F88857B}"/>
+      <thm15:themeFamily xmlns:thm15="http://schemas.microsoft.com/office/thememl/2012/main" name="Metropolitan" id="{4C5440D6-04D2-4954-96CF-F251137069B2}" vid="{79CFCA13-9412-4290-BB4B-85112F88857B}"/>
     </a:ext>
   </a:extLst>
 </a:theme>

</xml_diff>

<commit_message>
#Changed report #3 image
</commit_message>
<xml_diff>
--- a/docs/Reuniones/Sprint 5/Reunion Formal 2014-11-10/Reunion Formal.pptx
+++ b/docs/Reuniones/Sprint 5/Reunion Formal 2014-11-10/Reunion Formal.pptx
@@ -339,7 +339,7 @@
             <a:fld id="{A3B91EB6-4160-46A1-BFEE-CCE548EA35CA}" type="datetimeFigureOut">
               <a:rPr lang="es-AR" smtClean="0"/>
               <a:pPr/>
-              <a:t>10/11/2013</a:t>
+              <a:t>11/11/2013</a:t>
             </a:fld>
             <a:endParaRPr lang="es-AR"/>
           </a:p>
@@ -531,7 +531,7 @@
             <a:fld id="{A3B91EB6-4160-46A1-BFEE-CCE548EA35CA}" type="datetimeFigureOut">
               <a:rPr lang="es-AR" smtClean="0"/>
               <a:pPr/>
-              <a:t>10/11/2013</a:t>
+              <a:t>11/11/2013</a:t>
             </a:fld>
             <a:endParaRPr lang="es-AR"/>
           </a:p>
@@ -713,7 +713,7 @@
             <a:fld id="{A3B91EB6-4160-46A1-BFEE-CCE548EA35CA}" type="datetimeFigureOut">
               <a:rPr lang="es-AR" smtClean="0"/>
               <a:pPr/>
-              <a:t>10/11/2013</a:t>
+              <a:t>11/11/2013</a:t>
             </a:fld>
             <a:endParaRPr lang="es-AR"/>
           </a:p>
@@ -885,7 +885,7 @@
             <a:fld id="{A3B91EB6-4160-46A1-BFEE-CCE548EA35CA}" type="datetimeFigureOut">
               <a:rPr lang="es-AR" smtClean="0"/>
               <a:pPr/>
-              <a:t>10/11/2013</a:t>
+              <a:t>11/11/2013</a:t>
             </a:fld>
             <a:endParaRPr lang="es-AR"/>
           </a:p>
@@ -1143,7 +1143,7 @@
             <a:fld id="{A3B91EB6-4160-46A1-BFEE-CCE548EA35CA}" type="datetimeFigureOut">
               <a:rPr lang="es-AR" smtClean="0"/>
               <a:pPr/>
-              <a:t>10/11/2013</a:t>
+              <a:t>11/11/2013</a:t>
             </a:fld>
             <a:endParaRPr lang="es-AR"/>
           </a:p>
@@ -1433,7 +1433,7 @@
             <a:fld id="{A3B91EB6-4160-46A1-BFEE-CCE548EA35CA}" type="datetimeFigureOut">
               <a:rPr lang="es-AR" smtClean="0"/>
               <a:pPr/>
-              <a:t>10/11/2013</a:t>
+              <a:t>11/11/2013</a:t>
             </a:fld>
             <a:endParaRPr lang="es-AR"/>
           </a:p>
@@ -1873,7 +1873,7 @@
             <a:fld id="{A3B91EB6-4160-46A1-BFEE-CCE548EA35CA}" type="datetimeFigureOut">
               <a:rPr lang="es-AR" smtClean="0"/>
               <a:pPr/>
-              <a:t>10/11/2013</a:t>
+              <a:t>11/11/2013</a:t>
             </a:fld>
             <a:endParaRPr lang="es-AR"/>
           </a:p>
@@ -1993,7 +1993,7 @@
             <a:fld id="{A3B91EB6-4160-46A1-BFEE-CCE548EA35CA}" type="datetimeFigureOut">
               <a:rPr lang="es-AR" smtClean="0"/>
               <a:pPr/>
-              <a:t>10/11/2013</a:t>
+              <a:t>11/11/2013</a:t>
             </a:fld>
             <a:endParaRPr lang="es-AR"/>
           </a:p>
@@ -2090,7 +2090,7 @@
             <a:fld id="{A3B91EB6-4160-46A1-BFEE-CCE548EA35CA}" type="datetimeFigureOut">
               <a:rPr lang="es-AR" smtClean="0"/>
               <a:pPr/>
-              <a:t>10/11/2013</a:t>
+              <a:t>11/11/2013</a:t>
             </a:fld>
             <a:endParaRPr lang="es-AR"/>
           </a:p>
@@ -2448,7 +2448,7 @@
             <a:fld id="{A3B91EB6-4160-46A1-BFEE-CCE548EA35CA}" type="datetimeFigureOut">
               <a:rPr lang="es-AR" smtClean="0"/>
               <a:pPr/>
-              <a:t>10/11/2013</a:t>
+              <a:t>11/11/2013</a:t>
             </a:fld>
             <a:endParaRPr lang="es-AR"/>
           </a:p>
@@ -2766,7 +2766,7 @@
             <a:fld id="{A3B91EB6-4160-46A1-BFEE-CCE548EA35CA}" type="datetimeFigureOut">
               <a:rPr lang="es-AR" smtClean="0"/>
               <a:pPr/>
-              <a:t>10/11/2013</a:t>
+              <a:t>11/11/2013</a:t>
             </a:fld>
             <a:endParaRPr lang="es-AR"/>
           </a:p>
@@ -3001,7 +3001,7 @@
             <a:fld id="{A3B91EB6-4160-46A1-BFEE-CCE548EA35CA}" type="datetimeFigureOut">
               <a:rPr lang="es-AR" smtClean="0"/>
               <a:pPr/>
-              <a:t>10/11/2013</a:t>
+              <a:t>11/11/2013</a:t>
             </a:fld>
             <a:endParaRPr lang="es-AR"/>
           </a:p>
@@ -4843,8 +4843,12 @@
               <a:buNone/>
             </a:pPr>
             <a:r>
+              <a:rPr lang="es-AR" sz="2600" i="1" dirty="0" smtClean="0"/>
+              <a:t>Reporte Ventas/Reservas Por Función</a:t>
+            </a:r>
+            <a:r>
               <a:rPr lang="es-AR" sz="2600" dirty="0" smtClean="0"/>
-              <a:t>Reporte Ventas/Reservas Por Función </a:t>
+              <a:t> </a:t>
             </a:r>
           </a:p>
           <a:p>
@@ -5436,22 +5440,28 @@
       </p:sp>
       <p:pic>
         <p:nvPicPr>
-          <p:cNvPr id="4" name="Picture 3"/>
+          <p:cNvPr id="3" name="Picture 2"/>
           <p:cNvPicPr>
             <a:picLocks noChangeAspect="1"/>
           </p:cNvPicPr>
           <p:nvPr/>
         </p:nvPicPr>
         <p:blipFill>
-          <a:blip r:embed="rId2"/>
+          <a:blip r:embed="rId2">
+            <a:extLst>
+              <a:ext uri="{28A0092B-C50C-407E-A947-70E740481C1C}">
+                <a14:useLocalDpi xmlns:a14="http://schemas.microsoft.com/office/drawing/2010/main" val="0"/>
+              </a:ext>
+            </a:extLst>
+          </a:blip>
           <a:stretch>
             <a:fillRect/>
           </a:stretch>
         </p:blipFill>
         <p:spPr>
           <a:xfrm>
-            <a:off x="416858" y="1913800"/>
-            <a:ext cx="5325165" cy="4742494"/>
+            <a:off x="157017" y="1978525"/>
+            <a:ext cx="5015347" cy="4750801"/>
           </a:xfrm>
           <a:prstGeom prst="rect">
             <a:avLst/>
@@ -5460,22 +5470,28 @@
       </p:pic>
       <p:pic>
         <p:nvPicPr>
-          <p:cNvPr id="7" name="Picture 6"/>
+          <p:cNvPr id="5" name="Picture 4"/>
           <p:cNvPicPr>
             <a:picLocks noChangeAspect="1"/>
           </p:cNvPicPr>
           <p:nvPr/>
         </p:nvPicPr>
         <p:blipFill>
-          <a:blip r:embed="rId3"/>
+          <a:blip r:embed="rId3">
+            <a:extLst>
+              <a:ext uri="{28A0092B-C50C-407E-A947-70E740481C1C}">
+                <a14:useLocalDpi xmlns:a14="http://schemas.microsoft.com/office/drawing/2010/main" val="0"/>
+              </a:ext>
+            </a:extLst>
+          </a:blip>
           <a:stretch>
             <a:fillRect/>
           </a:stretch>
         </p:blipFill>
         <p:spPr>
           <a:xfrm>
-            <a:off x="5982389" y="1913800"/>
-            <a:ext cx="5483978" cy="4890704"/>
+            <a:off x="6677891" y="1898898"/>
+            <a:ext cx="4470633" cy="4910054"/>
           </a:xfrm>
           <a:prstGeom prst="rect">
             <a:avLst/>

</xml_diff>